<commit_message>
Update PCA and screeplot
</commit_message>
<xml_diff>
--- a/figs/pymol_residues_highlighted.pptx
+++ b/figs/pymol_residues_highlighted.pptx
@@ -246,7 +246,7 @@
           <a:p>
             <a:fld id="{B6B302A7-516C-2144-8607-482F55CA7E6C}" type="datetimeFigureOut">
               <a:rPr lang="en-US" smtClean="0"/>
-              <a:t>1/12/20</a:t>
+              <a:t>1/17/20</a:t>
             </a:fld>
             <a:endParaRPr lang="en-US"/>
           </a:p>
@@ -416,7 +416,7 @@
           <a:p>
             <a:fld id="{B6B302A7-516C-2144-8607-482F55CA7E6C}" type="datetimeFigureOut">
               <a:rPr lang="en-US" smtClean="0"/>
-              <a:t>1/12/20</a:t>
+              <a:t>1/17/20</a:t>
             </a:fld>
             <a:endParaRPr lang="en-US"/>
           </a:p>
@@ -596,7 +596,7 @@
           <a:p>
             <a:fld id="{B6B302A7-516C-2144-8607-482F55CA7E6C}" type="datetimeFigureOut">
               <a:rPr lang="en-US" smtClean="0"/>
-              <a:t>1/12/20</a:t>
+              <a:t>1/17/20</a:t>
             </a:fld>
             <a:endParaRPr lang="en-US"/>
           </a:p>
@@ -766,7 +766,7 @@
           <a:p>
             <a:fld id="{B6B302A7-516C-2144-8607-482F55CA7E6C}" type="datetimeFigureOut">
               <a:rPr lang="en-US" smtClean="0"/>
-              <a:t>1/12/20</a:t>
+              <a:t>1/17/20</a:t>
             </a:fld>
             <a:endParaRPr lang="en-US"/>
           </a:p>
@@ -1010,7 +1010,7 @@
           <a:p>
             <a:fld id="{B6B302A7-516C-2144-8607-482F55CA7E6C}" type="datetimeFigureOut">
               <a:rPr lang="en-US" smtClean="0"/>
-              <a:t>1/12/20</a:t>
+              <a:t>1/17/20</a:t>
             </a:fld>
             <a:endParaRPr lang="en-US"/>
           </a:p>
@@ -1242,7 +1242,7 @@
           <a:p>
             <a:fld id="{B6B302A7-516C-2144-8607-482F55CA7E6C}" type="datetimeFigureOut">
               <a:rPr lang="en-US" smtClean="0"/>
-              <a:t>1/12/20</a:t>
+              <a:t>1/17/20</a:t>
             </a:fld>
             <a:endParaRPr lang="en-US"/>
           </a:p>
@@ -1609,7 +1609,7 @@
           <a:p>
             <a:fld id="{B6B302A7-516C-2144-8607-482F55CA7E6C}" type="datetimeFigureOut">
               <a:rPr lang="en-US" smtClean="0"/>
-              <a:t>1/12/20</a:t>
+              <a:t>1/17/20</a:t>
             </a:fld>
             <a:endParaRPr lang="en-US"/>
           </a:p>
@@ -1727,7 +1727,7 @@
           <a:p>
             <a:fld id="{B6B302A7-516C-2144-8607-482F55CA7E6C}" type="datetimeFigureOut">
               <a:rPr lang="en-US" smtClean="0"/>
-              <a:t>1/12/20</a:t>
+              <a:t>1/17/20</a:t>
             </a:fld>
             <a:endParaRPr lang="en-US"/>
           </a:p>
@@ -1822,7 +1822,7 @@
           <a:p>
             <a:fld id="{B6B302A7-516C-2144-8607-482F55CA7E6C}" type="datetimeFigureOut">
               <a:rPr lang="en-US" smtClean="0"/>
-              <a:t>1/12/20</a:t>
+              <a:t>1/17/20</a:t>
             </a:fld>
             <a:endParaRPr lang="en-US"/>
           </a:p>
@@ -2099,7 +2099,7 @@
           <a:p>
             <a:fld id="{B6B302A7-516C-2144-8607-482F55CA7E6C}" type="datetimeFigureOut">
               <a:rPr lang="en-US" smtClean="0"/>
-              <a:t>1/12/20</a:t>
+              <a:t>1/17/20</a:t>
             </a:fld>
             <a:endParaRPr lang="en-US"/>
           </a:p>
@@ -2356,7 +2356,7 @@
           <a:p>
             <a:fld id="{B6B302A7-516C-2144-8607-482F55CA7E6C}" type="datetimeFigureOut">
               <a:rPr lang="en-US" smtClean="0"/>
-              <a:t>1/12/20</a:t>
+              <a:t>1/17/20</a:t>
             </a:fld>
             <a:endParaRPr lang="en-US"/>
           </a:p>
@@ -2569,7 +2569,7 @@
           <a:p>
             <a:fld id="{B6B302A7-516C-2144-8607-482F55CA7E6C}" type="datetimeFigureOut">
               <a:rPr lang="en-US" smtClean="0"/>
-              <a:t>1/12/20</a:t>
+              <a:t>1/17/20</a:t>
             </a:fld>
             <a:endParaRPr lang="en-US"/>
           </a:p>
@@ -3115,8 +3115,8 @@
         </p:nvSpPr>
         <p:spPr>
           <a:xfrm>
-            <a:off x="2686051" y="6256858"/>
-            <a:ext cx="1619732" cy="2585323"/>
+            <a:off x="2660036" y="7008372"/>
+            <a:ext cx="1378819" cy="2019750"/>
           </a:xfrm>
           <a:prstGeom prst="rect">
             <a:avLst/>
@@ -3132,20 +3132,6 @@
             <a:spAutoFit/>
           </a:bodyPr>
           <a:lstStyle/>
-          <a:p>
-            <a:pPr algn="ctr"/>
-            <a:endParaRPr lang="en-US" b="1" i="1" dirty="0">
-              <a:latin typeface="Arial" panose="020B0604020202020204" pitchFamily="34" charset="0"/>
-              <a:cs typeface="Arial" panose="020B0604020202020204" pitchFamily="34" charset="0"/>
-            </a:endParaRPr>
-          </a:p>
-          <a:p>
-            <a:pPr algn="ctr"/>
-            <a:endParaRPr lang="en-US" b="1" i="1" dirty="0">
-              <a:latin typeface="Arial" panose="020B0604020202020204" pitchFamily="34" charset="0"/>
-              <a:cs typeface="Arial" panose="020B0604020202020204" pitchFamily="34" charset="0"/>
-            </a:endParaRPr>
-          </a:p>
           <a:p>
             <a:pPr algn="ctr"/>
             <a:endParaRPr lang="en-US" b="1" i="1" dirty="0">
@@ -3222,7 +3208,7 @@
           </a:prstGeom>
           <a:solidFill>
             <a:srgbClr val="8E5499">
-              <a:alpha val="29804"/>
+              <a:alpha val="40000"/>
             </a:srgbClr>
           </a:solidFill>
         </p:spPr>
@@ -3264,7 +3250,7 @@
           </a:prstGeom>
           <a:solidFill>
             <a:srgbClr val="8E5499">
-              <a:alpha val="29804"/>
+              <a:alpha val="40000"/>
             </a:srgbClr>
           </a:solidFill>
         </p:spPr>
@@ -3307,7 +3293,7 @@
           </a:prstGeom>
           <a:solidFill>
             <a:srgbClr val="366BA1">
-              <a:alpha val="25490"/>
+              <a:alpha val="40000"/>
             </a:srgbClr>
           </a:solidFill>
         </p:spPr>
@@ -3350,7 +3336,7 @@
           </a:prstGeom>
           <a:solidFill>
             <a:srgbClr val="C00000">
-              <a:alpha val="24706"/>
+              <a:alpha val="40000"/>
             </a:srgbClr>
           </a:solidFill>
         </p:spPr>
@@ -3393,7 +3379,7 @@
           </a:prstGeom>
           <a:solidFill>
             <a:srgbClr val="366BA1">
-              <a:alpha val="25490"/>
+              <a:alpha val="40000"/>
             </a:srgbClr>
           </a:solidFill>
         </p:spPr>
@@ -3436,7 +3422,7 @@
           </a:prstGeom>
           <a:solidFill>
             <a:srgbClr val="C00000">
-              <a:alpha val="24706"/>
+              <a:alpha val="40000"/>
             </a:srgbClr>
           </a:solidFill>
         </p:spPr>
@@ -3479,7 +3465,7 @@
           </a:prstGeom>
           <a:solidFill>
             <a:srgbClr val="C00000">
-              <a:alpha val="24706"/>
+              <a:alpha val="40000"/>
             </a:srgbClr>
           </a:solidFill>
         </p:spPr>
@@ -3522,7 +3508,7 @@
           </a:prstGeom>
           <a:solidFill>
             <a:srgbClr val="366BA1">
-              <a:alpha val="25490"/>
+              <a:alpha val="40000"/>
             </a:srgbClr>
           </a:solidFill>
         </p:spPr>
@@ -3565,7 +3551,7 @@
           </a:prstGeom>
           <a:solidFill>
             <a:srgbClr val="366BA1">
-              <a:alpha val="25490"/>
+              <a:alpha val="40000"/>
             </a:srgbClr>
           </a:solidFill>
         </p:spPr>
@@ -3608,7 +3594,7 @@
           </a:prstGeom>
           <a:solidFill>
             <a:srgbClr val="366BA1">
-              <a:alpha val="25490"/>
+              <a:alpha val="40000"/>
             </a:srgbClr>
           </a:solidFill>
         </p:spPr>
@@ -3651,7 +3637,7 @@
           </a:prstGeom>
           <a:solidFill>
             <a:srgbClr val="C00000">
-              <a:alpha val="25098"/>
+              <a:alpha val="40000"/>
             </a:srgbClr>
           </a:solidFill>
         </p:spPr>
@@ -3685,7 +3671,7 @@
         </p:nvSpPr>
         <p:spPr>
           <a:xfrm>
-            <a:off x="2699958" y="6541931"/>
+            <a:off x="2671611" y="6630045"/>
             <a:ext cx="762892" cy="369332"/>
           </a:xfrm>
           <a:prstGeom prst="rect">
@@ -3693,7 +3679,7 @@
           </a:prstGeom>
           <a:solidFill>
             <a:srgbClr val="366BA1">
-              <a:alpha val="25490"/>
+              <a:alpha val="40000"/>
             </a:srgbClr>
           </a:solidFill>
         </p:spPr>
@@ -3736,7 +3722,7 @@
           </a:prstGeom>
           <a:solidFill>
             <a:srgbClr val="C00000">
-              <a:alpha val="24706"/>
+              <a:alpha val="40000"/>
             </a:srgbClr>
           </a:solidFill>
         </p:spPr>
@@ -3779,7 +3765,7 @@
           </a:prstGeom>
           <a:solidFill>
             <a:srgbClr val="366BA1">
-              <a:alpha val="25098"/>
+              <a:alpha val="40000"/>
             </a:srgbClr>
           </a:solidFill>
         </p:spPr>
@@ -3796,6 +3782,86 @@
               </a:rPr>
               <a:t>A140</a:t>
             </a:r>
+          </a:p>
+        </p:txBody>
+      </p:sp>
+      <p:sp>
+        <p:nvSpPr>
+          <p:cNvPr id="28" name="TextBox 27">
+            <a:extLst>
+              <a:ext uri="{FF2B5EF4-FFF2-40B4-BE49-F238E27FC236}">
+                <a16:creationId xmlns:a16="http://schemas.microsoft.com/office/drawing/2014/main" id="{7D199F43-EAA0-D84D-97E1-F73D395866CD}"/>
+              </a:ext>
+            </a:extLst>
+          </p:cNvPr>
+          <p:cNvSpPr txBox="1"/>
+          <p:nvPr/>
+        </p:nvSpPr>
+        <p:spPr>
+          <a:xfrm>
+            <a:off x="2666744" y="6259423"/>
+            <a:ext cx="1390031" cy="369332"/>
+          </a:xfrm>
+          <a:prstGeom prst="rect">
+            <a:avLst/>
+          </a:prstGeom>
+          <a:solidFill>
+            <a:srgbClr val="E87B0E">
+              <a:alpha val="14902"/>
+            </a:srgbClr>
+          </a:solidFill>
+        </p:spPr>
+        <p:txBody>
+          <a:bodyPr wrap="square" rtlCol="0">
+            <a:spAutoFit/>
+          </a:bodyPr>
+          <a:lstStyle/>
+          <a:p>
+            <a:pPr algn="ctr"/>
+            <a:endParaRPr lang="en-US" b="1" i="1" dirty="0">
+              <a:latin typeface="Arial" panose="020B0604020202020204" pitchFamily="34" charset="0"/>
+              <a:cs typeface="Arial" panose="020B0604020202020204" pitchFamily="34" charset="0"/>
+            </a:endParaRPr>
+          </a:p>
+        </p:txBody>
+      </p:sp>
+      <p:sp>
+        <p:nvSpPr>
+          <p:cNvPr id="29" name="TextBox 28">
+            <a:extLst>
+              <a:ext uri="{FF2B5EF4-FFF2-40B4-BE49-F238E27FC236}">
+                <a16:creationId xmlns:a16="http://schemas.microsoft.com/office/drawing/2014/main" id="{20A1E7E3-B10F-6648-9050-C3E7948A6651}"/>
+              </a:ext>
+            </a:extLst>
+          </p:cNvPr>
+          <p:cNvSpPr txBox="1"/>
+          <p:nvPr/>
+        </p:nvSpPr>
+        <p:spPr>
+          <a:xfrm>
+            <a:off x="3440520" y="6628755"/>
+            <a:ext cx="598336" cy="369332"/>
+          </a:xfrm>
+          <a:prstGeom prst="rect">
+            <a:avLst/>
+          </a:prstGeom>
+          <a:solidFill>
+            <a:srgbClr val="E87B0E">
+              <a:alpha val="14902"/>
+            </a:srgbClr>
+          </a:solidFill>
+        </p:spPr>
+        <p:txBody>
+          <a:bodyPr wrap="square" rtlCol="0">
+            <a:spAutoFit/>
+          </a:bodyPr>
+          <a:lstStyle/>
+          <a:p>
+            <a:pPr algn="ctr"/>
+            <a:endParaRPr lang="en-US" b="1" i="1" dirty="0">
+              <a:latin typeface="Arial" panose="020B0604020202020204" pitchFamily="34" charset="0"/>
+              <a:cs typeface="Arial" panose="020B0604020202020204" pitchFamily="34" charset="0"/>
+            </a:endParaRPr>
           </a:p>
         </p:txBody>
       </p:sp>

</xml_diff>